<commit_message>
Updating figures and file structure
</commit_message>
<xml_diff>
--- a/Images/fig1b.pptx
+++ b/Images/fig1b.pptx
@@ -197,7 +197,7 @@
           <a:p>
             <a:fld id="{D34CEA9E-E5A5-49C8-A578-AF124664FEC0}" type="datetimeFigureOut">
               <a:rPr lang="en-US" smtClean="0"/>
-              <a:t>9/13/2021</a:t>
+              <a:t>9/23/2021</a:t>
             </a:fld>
             <a:endParaRPr lang="en-US"/>
           </a:p>
@@ -684,7 +684,7 @@
           <a:p>
             <a:fld id="{BA05AF01-4F0E-4718-A4C1-DFCBB47EE5F2}" type="datetimeFigureOut">
               <a:rPr lang="en-US" smtClean="0"/>
-              <a:t>9/13/2021</a:t>
+              <a:t>9/23/2021</a:t>
             </a:fld>
             <a:endParaRPr lang="en-US"/>
           </a:p>
@@ -854,7 +854,7 @@
           <a:p>
             <a:fld id="{BA05AF01-4F0E-4718-A4C1-DFCBB47EE5F2}" type="datetimeFigureOut">
               <a:rPr lang="en-US" smtClean="0"/>
-              <a:t>9/13/2021</a:t>
+              <a:t>9/23/2021</a:t>
             </a:fld>
             <a:endParaRPr lang="en-US"/>
           </a:p>
@@ -1034,7 +1034,7 @@
           <a:p>
             <a:fld id="{BA05AF01-4F0E-4718-A4C1-DFCBB47EE5F2}" type="datetimeFigureOut">
               <a:rPr lang="en-US" smtClean="0"/>
-              <a:t>9/13/2021</a:t>
+              <a:t>9/23/2021</a:t>
             </a:fld>
             <a:endParaRPr lang="en-US"/>
           </a:p>
@@ -1204,7 +1204,7 @@
           <a:p>
             <a:fld id="{BA05AF01-4F0E-4718-A4C1-DFCBB47EE5F2}" type="datetimeFigureOut">
               <a:rPr lang="en-US" smtClean="0"/>
-              <a:t>9/13/2021</a:t>
+              <a:t>9/23/2021</a:t>
             </a:fld>
             <a:endParaRPr lang="en-US"/>
           </a:p>
@@ -1448,7 +1448,7 @@
           <a:p>
             <a:fld id="{BA05AF01-4F0E-4718-A4C1-DFCBB47EE5F2}" type="datetimeFigureOut">
               <a:rPr lang="en-US" smtClean="0"/>
-              <a:t>9/13/2021</a:t>
+              <a:t>9/23/2021</a:t>
             </a:fld>
             <a:endParaRPr lang="en-US"/>
           </a:p>
@@ -1680,7 +1680,7 @@
           <a:p>
             <a:fld id="{BA05AF01-4F0E-4718-A4C1-DFCBB47EE5F2}" type="datetimeFigureOut">
               <a:rPr lang="en-US" smtClean="0"/>
-              <a:t>9/13/2021</a:t>
+              <a:t>9/23/2021</a:t>
             </a:fld>
             <a:endParaRPr lang="en-US"/>
           </a:p>
@@ -2047,7 +2047,7 @@
           <a:p>
             <a:fld id="{BA05AF01-4F0E-4718-A4C1-DFCBB47EE5F2}" type="datetimeFigureOut">
               <a:rPr lang="en-US" smtClean="0"/>
-              <a:t>9/13/2021</a:t>
+              <a:t>9/23/2021</a:t>
             </a:fld>
             <a:endParaRPr lang="en-US"/>
           </a:p>
@@ -2165,7 +2165,7 @@
           <a:p>
             <a:fld id="{BA05AF01-4F0E-4718-A4C1-DFCBB47EE5F2}" type="datetimeFigureOut">
               <a:rPr lang="en-US" smtClean="0"/>
-              <a:t>9/13/2021</a:t>
+              <a:t>9/23/2021</a:t>
             </a:fld>
             <a:endParaRPr lang="en-US"/>
           </a:p>
@@ -2260,7 +2260,7 @@
           <a:p>
             <a:fld id="{BA05AF01-4F0E-4718-A4C1-DFCBB47EE5F2}" type="datetimeFigureOut">
               <a:rPr lang="en-US" smtClean="0"/>
-              <a:t>9/13/2021</a:t>
+              <a:t>9/23/2021</a:t>
             </a:fld>
             <a:endParaRPr lang="en-US"/>
           </a:p>
@@ -2537,7 +2537,7 @@
           <a:p>
             <a:fld id="{BA05AF01-4F0E-4718-A4C1-DFCBB47EE5F2}" type="datetimeFigureOut">
               <a:rPr lang="en-US" smtClean="0"/>
-              <a:t>9/13/2021</a:t>
+              <a:t>9/23/2021</a:t>
             </a:fld>
             <a:endParaRPr lang="en-US"/>
           </a:p>
@@ -2794,7 +2794,7 @@
           <a:p>
             <a:fld id="{BA05AF01-4F0E-4718-A4C1-DFCBB47EE5F2}" type="datetimeFigureOut">
               <a:rPr lang="en-US" smtClean="0"/>
-              <a:t>9/13/2021</a:t>
+              <a:t>9/23/2021</a:t>
             </a:fld>
             <a:endParaRPr lang="en-US"/>
           </a:p>
@@ -3007,7 +3007,7 @@
           <a:p>
             <a:fld id="{BA05AF01-4F0E-4718-A4C1-DFCBB47EE5F2}" type="datetimeFigureOut">
               <a:rPr lang="en-US" smtClean="0"/>
-              <a:t>9/13/2021</a:t>
+              <a:t>9/23/2021</a:t>
             </a:fld>
             <a:endParaRPr lang="en-US"/>
           </a:p>
@@ -7791,8 +7791,8 @@
         </p:nvSpPr>
         <p:spPr>
           <a:xfrm rot="16200000">
-            <a:off x="7046228" y="10979507"/>
-            <a:ext cx="1364476" cy="369332"/>
+            <a:off x="6276788" y="10979507"/>
+            <a:ext cx="2903359" cy="369332"/>
           </a:xfrm>
           <a:prstGeom prst="rect">
             <a:avLst/>
@@ -7812,7 +7812,7 @@
                 <a:latin typeface="Times New Roman" panose="02020603050405020304" pitchFamily="18" charset="0"/>
                 <a:cs typeface="Times New Roman" panose="02020603050405020304" pitchFamily="18" charset="0"/>
               </a:rPr>
-              <a:t>Performance</a:t>
+              <a:t>Performance of DeepPurpose</a:t>
             </a:r>
           </a:p>
         </p:txBody>

</xml_diff>